<commit_message>
Updated all scripts and functions to use the new notes excel file name instead of metadata
</commit_message>
<xml_diff>
--- a/DUNEX-Notes.pptx
+++ b/DUNEX-Notes.pptx
@@ -5,7 +5,8 @@
     <p:sldMasterId id="2147483648" r:id="rId1"/>
   </p:sldMasterIdLst>
   <p:sldIdLst>
-    <p:sldId id="256" r:id="rId2"/>
+    <p:sldId id="257" r:id="rId2"/>
+    <p:sldId id="256" r:id="rId3"/>
   </p:sldIdLst>
   <p:sldSz cx="12192000" cy="6858000"/>
   <p:notesSz cx="6858000" cy="9144000"/>
@@ -259,7 +260,7 @@
           <a:p>
             <a:fld id="{A951B285-EC96-7740-A54D-52CFB9B07189}" type="datetimeFigureOut">
               <a:rPr lang="en-US" smtClean="0"/>
-              <a:t>9/21/21</a:t>
+              <a:t>9/28/21</a:t>
             </a:fld>
             <a:endParaRPr lang="en-US"/>
           </a:p>
@@ -457,7 +458,7 @@
           <a:p>
             <a:fld id="{A951B285-EC96-7740-A54D-52CFB9B07189}" type="datetimeFigureOut">
               <a:rPr lang="en-US" smtClean="0"/>
-              <a:t>9/21/21</a:t>
+              <a:t>9/28/21</a:t>
             </a:fld>
             <a:endParaRPr lang="en-US"/>
           </a:p>
@@ -665,7 +666,7 @@
           <a:p>
             <a:fld id="{A951B285-EC96-7740-A54D-52CFB9B07189}" type="datetimeFigureOut">
               <a:rPr lang="en-US" smtClean="0"/>
-              <a:t>9/21/21</a:t>
+              <a:t>9/28/21</a:t>
             </a:fld>
             <a:endParaRPr lang="en-US"/>
           </a:p>
@@ -863,7 +864,7 @@
           <a:p>
             <a:fld id="{A951B285-EC96-7740-A54D-52CFB9B07189}" type="datetimeFigureOut">
               <a:rPr lang="en-US" smtClean="0"/>
-              <a:t>9/21/21</a:t>
+              <a:t>9/28/21</a:t>
             </a:fld>
             <a:endParaRPr lang="en-US"/>
           </a:p>
@@ -1138,7 +1139,7 @@
           <a:p>
             <a:fld id="{A951B285-EC96-7740-A54D-52CFB9B07189}" type="datetimeFigureOut">
               <a:rPr lang="en-US" smtClean="0"/>
-              <a:t>9/21/21</a:t>
+              <a:t>9/28/21</a:t>
             </a:fld>
             <a:endParaRPr lang="en-US"/>
           </a:p>
@@ -1403,7 +1404,7 @@
           <a:p>
             <a:fld id="{A951B285-EC96-7740-A54D-52CFB9B07189}" type="datetimeFigureOut">
               <a:rPr lang="en-US" smtClean="0"/>
-              <a:t>9/21/21</a:t>
+              <a:t>9/28/21</a:t>
             </a:fld>
             <a:endParaRPr lang="en-US"/>
           </a:p>
@@ -1815,7 +1816,7 @@
           <a:p>
             <a:fld id="{A951B285-EC96-7740-A54D-52CFB9B07189}" type="datetimeFigureOut">
               <a:rPr lang="en-US" smtClean="0"/>
-              <a:t>9/21/21</a:t>
+              <a:t>9/28/21</a:t>
             </a:fld>
             <a:endParaRPr lang="en-US"/>
           </a:p>
@@ -1956,7 +1957,7 @@
           <a:p>
             <a:fld id="{A951B285-EC96-7740-A54D-52CFB9B07189}" type="datetimeFigureOut">
               <a:rPr lang="en-US" smtClean="0"/>
-              <a:t>9/21/21</a:t>
+              <a:t>9/28/21</a:t>
             </a:fld>
             <a:endParaRPr lang="en-US"/>
           </a:p>
@@ -2069,7 +2070,7 @@
           <a:p>
             <a:fld id="{A951B285-EC96-7740-A54D-52CFB9B07189}" type="datetimeFigureOut">
               <a:rPr lang="en-US" smtClean="0"/>
-              <a:t>9/21/21</a:t>
+              <a:t>9/28/21</a:t>
             </a:fld>
             <a:endParaRPr lang="en-US"/>
           </a:p>
@@ -2380,7 +2381,7 @@
           <a:p>
             <a:fld id="{A951B285-EC96-7740-A54D-52CFB9B07189}" type="datetimeFigureOut">
               <a:rPr lang="en-US" smtClean="0"/>
-              <a:t>9/21/21</a:t>
+              <a:t>9/28/21</a:t>
             </a:fld>
             <a:endParaRPr lang="en-US"/>
           </a:p>
@@ -2668,7 +2669,7 @@
           <a:p>
             <a:fld id="{A951B285-EC96-7740-A54D-52CFB9B07189}" type="datetimeFigureOut">
               <a:rPr lang="en-US" smtClean="0"/>
-              <a:t>9/21/21</a:t>
+              <a:t>9/28/21</a:t>
             </a:fld>
             <a:endParaRPr lang="en-US"/>
           </a:p>
@@ -2909,7 +2910,7 @@
           <a:p>
             <a:fld id="{A951B285-EC96-7740-A54D-52CFB9B07189}" type="datetimeFigureOut">
               <a:rPr lang="en-US" smtClean="0"/>
-              <a:t>9/21/21</a:t>
+              <a:t>9/28/21</a:t>
             </a:fld>
             <a:endParaRPr lang="en-US"/>
           </a:p>
@@ -3326,27 +3327,74 @@
           <a:chExt cx="0" cy="0"/>
         </a:xfrm>
       </p:grpSpPr>
-      <p:sp>
-        <p:nvSpPr>
-          <p:cNvPr id="4" name="TextBox 3">
-            <a:extLst>
-              <a:ext uri="{FF2B5EF4-FFF2-40B4-BE49-F238E27FC236}">
-                <a16:creationId xmlns:a16="http://schemas.microsoft.com/office/drawing/2014/main" id="{11B2E5BE-3A86-AE4B-8E90-CB470E42884F}"/>
-              </a:ext>
-            </a:extLst>
-          </p:cNvPr>
-          <p:cNvSpPr txBox="1"/>
+      <p:pic>
+        <p:nvPicPr>
+          <p:cNvPr id="1026" name="Picture 2" descr="The Corps&amp;#39; Field Research Facility unsurpassed for coastal observation and  research &amp;gt; Engineer Research and Development Center &amp;gt; News Stories">
+            <a:extLst>
+              <a:ext uri="{FF2B5EF4-FFF2-40B4-BE49-F238E27FC236}">
+                <a16:creationId xmlns:a16="http://schemas.microsoft.com/office/drawing/2014/main" id="{92D553F1-6548-A54A-B595-BB502284733B}"/>
+              </a:ext>
+            </a:extLst>
+          </p:cNvPr>
+          <p:cNvPicPr>
+            <a:picLocks noChangeAspect="1" noChangeArrowheads="1"/>
+          </p:cNvPicPr>
           <p:nvPr/>
-        </p:nvSpPr>
-        <p:spPr>
+        </p:nvPicPr>
+        <p:blipFill>
+          <a:blip r:embed="rId2">
+            <a:extLst>
+              <a:ext uri="{28A0092B-C50C-407E-A947-70E740481C1C}">
+                <a14:useLocalDpi xmlns:a14="http://schemas.microsoft.com/office/drawing/2010/main" val="0"/>
+              </a:ext>
+            </a:extLst>
+          </a:blip>
+          <a:srcRect/>
+          <a:stretch>
+            <a:fillRect/>
+          </a:stretch>
+        </p:blipFill>
+        <p:spPr bwMode="auto">
           <a:xfrm>
             <a:off x="0" y="0"/>
-            <a:ext cx="12192000" cy="646331"/>
+            <a:ext cx="12192000" cy="6856413"/>
           </a:xfrm>
           <a:prstGeom prst="rect">
             <a:avLst/>
           </a:prstGeom>
           <a:noFill/>
+          <a:extLst>
+            <a:ext uri="{909E8E84-426E-40DD-AFC4-6F175D3DCCD1}">
+              <a14:hiddenFill xmlns:a14="http://schemas.microsoft.com/office/drawing/2010/main">
+                <a:solidFill>
+                  <a:srgbClr val="FFFFFF"/>
+                </a:solidFill>
+              </a14:hiddenFill>
+            </a:ext>
+          </a:extLst>
+        </p:spPr>
+      </p:pic>
+      <p:sp>
+        <p:nvSpPr>
+          <p:cNvPr id="4" name="TextBox 3">
+            <a:extLst>
+              <a:ext uri="{FF2B5EF4-FFF2-40B4-BE49-F238E27FC236}">
+                <a16:creationId xmlns:a16="http://schemas.microsoft.com/office/drawing/2014/main" id="{51974223-E6BD-CE4E-BB02-D62699B83C4D}"/>
+              </a:ext>
+            </a:extLst>
+          </p:cNvPr>
+          <p:cNvSpPr txBox="1"/>
+          <p:nvPr/>
+        </p:nvSpPr>
+        <p:spPr>
+          <a:xfrm>
+            <a:off x="0" y="128588"/>
+            <a:ext cx="12192000" cy="584775"/>
+          </a:xfrm>
+          <a:prstGeom prst="rect">
+            <a:avLst/>
+          </a:prstGeom>
+          <a:noFill/>
         </p:spPr>
         <p:txBody>
           <a:bodyPr wrap="square" rtlCol="0">
@@ -3356,8 +3404,78 @@
           <a:p>
             <a:pPr algn="ctr"/>
             <a:r>
+              <a:rPr lang="en-US" sz="3200" dirty="0"/>
+              <a:t>DUNEX 2021 Main Experiment</a:t>
+            </a:r>
+          </a:p>
+        </p:txBody>
+      </p:sp>
+    </p:spTree>
+    <p:extLst>
+      <p:ext uri="{BB962C8B-B14F-4D97-AF65-F5344CB8AC3E}">
+        <p14:creationId xmlns:p14="http://schemas.microsoft.com/office/powerpoint/2010/main" val="93550325"/>
+      </p:ext>
+    </p:extLst>
+  </p:cSld>
+  <p:clrMapOvr>
+    <a:masterClrMapping/>
+  </p:clrMapOvr>
+</p:sld>
+</file>
+
+<file path=ppt/slides/slide2.xml><?xml version="1.0" encoding="utf-8"?>
+<p:sld xmlns:a="http://schemas.openxmlformats.org/drawingml/2006/main" xmlns:r="http://schemas.openxmlformats.org/officeDocument/2006/relationships" xmlns:p="http://schemas.openxmlformats.org/presentationml/2006/main">
+  <p:cSld>
+    <p:spTree>
+      <p:nvGrpSpPr>
+        <p:cNvPr id="1" name=""/>
+        <p:cNvGrpSpPr/>
+        <p:nvPr/>
+      </p:nvGrpSpPr>
+      <p:grpSpPr>
+        <a:xfrm>
+          <a:off x="0" y="0"/>
+          <a:ext cx="0" cy="0"/>
+          <a:chOff x="0" y="0"/>
+          <a:chExt cx="0" cy="0"/>
+        </a:xfrm>
+      </p:grpSpPr>
+      <p:sp>
+        <p:nvSpPr>
+          <p:cNvPr id="4" name="TextBox 3">
+            <a:extLst>
+              <a:ext uri="{FF2B5EF4-FFF2-40B4-BE49-F238E27FC236}">
+                <a16:creationId xmlns:a16="http://schemas.microsoft.com/office/drawing/2014/main" id="{11B2E5BE-3A86-AE4B-8E90-CB470E42884F}"/>
+              </a:ext>
+            </a:extLst>
+          </p:cNvPr>
+          <p:cNvSpPr txBox="1"/>
+          <p:nvPr/>
+        </p:nvSpPr>
+        <p:spPr>
+          <a:xfrm>
+            <a:off x="0" y="0"/>
+            <a:ext cx="12192000" cy="646331"/>
+          </a:xfrm>
+          <a:prstGeom prst="rect">
+            <a:avLst/>
+          </a:prstGeom>
+          <a:noFill/>
+        </p:spPr>
+        <p:txBody>
+          <a:bodyPr wrap="square" rtlCol="0">
+            <a:spAutoFit/>
+          </a:bodyPr>
+          <a:lstStyle/>
+          <a:p>
+            <a:pPr algn="ctr"/>
+            <a:r>
+              <a:rPr lang="en-US" dirty="0" err="1"/>
+              <a:t>DUNEXMainExp</a:t>
+            </a:r>
+            <a:r>
               <a:rPr lang="en-US" dirty="0"/>
-              <a:t>DUNEXMainExp_Oct2021 Directory Structure</a:t>
+              <a:t> Directory Structure</a:t>
             </a:r>
           </a:p>
           <a:p>
@@ -3380,7 +3498,7 @@
         </p:nvSpPr>
         <p:spPr>
           <a:xfrm>
-            <a:off x="4686300" y="646331"/>
+            <a:off x="4381499" y="646331"/>
             <a:ext cx="2819400" cy="555171"/>
           </a:xfrm>
           <a:prstGeom prst="roundRect">
@@ -3409,9 +3527,10 @@
           <a:p>
             <a:pPr algn="ctr"/>
             <a:r>
-              <a:rPr lang="en-US" dirty="0"/>
-              <a:t>DUNEXMainExp_Oct2021</a:t>
-            </a:r>
+              <a:rPr lang="en-US" sz="1400" dirty="0" err="1"/>
+              <a:t>DUNEXMainExp</a:t>
+            </a:r>
+            <a:endParaRPr lang="en-US" sz="1400" dirty="0"/>
           </a:p>
         </p:txBody>
       </p:sp>
@@ -3429,8 +3548,8 @@
         </p:nvSpPr>
         <p:spPr>
           <a:xfrm>
-            <a:off x="440871" y="2344501"/>
-            <a:ext cx="1747158" cy="555171"/>
+            <a:off x="118117" y="2344497"/>
+            <a:ext cx="2011131" cy="555171"/>
           </a:xfrm>
           <a:prstGeom prst="roundRect">
             <a:avLst/>
@@ -3458,9 +3577,10 @@
           <a:p>
             <a:pPr algn="ctr"/>
             <a:r>
-              <a:rPr lang="en-US" dirty="0"/>
-              <a:t>data</a:t>
-            </a:r>
+              <a:rPr lang="en-US" sz="1400" dirty="0" err="1"/>
+              <a:t>microSWIFT_data</a:t>
+            </a:r>
+            <a:endParaRPr lang="en-US" sz="1400" dirty="0"/>
           </a:p>
         </p:txBody>
       </p:sp>
@@ -3478,8 +3598,8 @@
         </p:nvSpPr>
         <p:spPr>
           <a:xfrm>
-            <a:off x="2452009" y="2344497"/>
-            <a:ext cx="2411186" cy="555171"/>
+            <a:off x="2373624" y="2344497"/>
+            <a:ext cx="2125432" cy="555171"/>
           </a:xfrm>
           <a:prstGeom prst="roundRect">
             <a:avLst/>
@@ -3507,10 +3627,10 @@
           <a:p>
             <a:pPr algn="ctr"/>
             <a:r>
-              <a:rPr lang="en-US" dirty="0" err="1"/>
+              <a:rPr lang="en-US" sz="1400" dirty="0" err="1"/>
               <a:t>document_templates</a:t>
             </a:r>
-            <a:endParaRPr lang="en-US" dirty="0"/>
+            <a:endParaRPr lang="en-US" sz="1400" dirty="0"/>
           </a:p>
         </p:txBody>
       </p:sp>
@@ -3528,8 +3648,8 @@
         </p:nvSpPr>
         <p:spPr>
           <a:xfrm>
-            <a:off x="5127175" y="2336999"/>
-            <a:ext cx="2030185" cy="555171"/>
+            <a:off x="5934883" y="2336998"/>
+            <a:ext cx="1017277" cy="555171"/>
           </a:xfrm>
           <a:prstGeom prst="roundRect">
             <a:avLst/>
@@ -3557,10 +3677,9 @@
           <a:p>
             <a:pPr algn="ctr"/>
             <a:r>
-              <a:rPr lang="en-US" dirty="0" err="1"/>
-              <a:t>plans_and_reports</a:t>
-            </a:r>
-            <a:endParaRPr lang="en-US" dirty="0"/>
+              <a:rPr lang="en-US" sz="1400" dirty="0"/>
+              <a:t>tools</a:t>
+            </a:r>
           </a:p>
         </p:txBody>
       </p:sp>
@@ -3578,8 +3697,8 @@
         </p:nvSpPr>
         <p:spPr>
           <a:xfrm>
-            <a:off x="7421340" y="2344497"/>
-            <a:ext cx="2030185" cy="555171"/>
+            <a:off x="7116540" y="2344497"/>
+            <a:ext cx="1396090" cy="555171"/>
           </a:xfrm>
           <a:prstGeom prst="roundRect">
             <a:avLst/>
@@ -3610,10 +3729,10 @@
           <a:p>
             <a:pPr algn="ctr"/>
             <a:r>
-              <a:rPr lang="en-US" dirty="0" err="1"/>
+              <a:rPr lang="en-US" sz="1400" dirty="0" err="1"/>
               <a:t>README.md</a:t>
             </a:r>
-            <a:endParaRPr lang="en-US" dirty="0"/>
+            <a:endParaRPr lang="en-US" sz="1400" dirty="0"/>
           </a:p>
         </p:txBody>
       </p:sp>
@@ -3631,8 +3750,8 @@
         </p:nvSpPr>
         <p:spPr>
           <a:xfrm>
-            <a:off x="9715506" y="2336998"/>
-            <a:ext cx="1992082" cy="555171"/>
+            <a:off x="8757556" y="2336998"/>
+            <a:ext cx="1570271" cy="555171"/>
           </a:xfrm>
           <a:prstGeom prst="roundRect">
             <a:avLst/>
@@ -3663,10 +3782,10 @@
           <a:p>
             <a:pPr algn="ctr"/>
             <a:r>
-              <a:rPr lang="en-US" dirty="0" err="1"/>
+              <a:rPr lang="en-US" sz="1400" dirty="0" err="1"/>
               <a:t>DUNEXMainExp_Metadata.xlsx</a:t>
             </a:r>
-            <a:endParaRPr lang="en-US" dirty="0"/>
+            <a:endParaRPr lang="en-US" sz="1400" dirty="0"/>
           </a:p>
         </p:txBody>
       </p:sp>
@@ -3715,7 +3834,7 @@
           <a:lstStyle/>
           <a:p>
             <a:pPr algn="ctr"/>
-            <a:endParaRPr lang="en-US" dirty="0"/>
+            <a:endParaRPr lang="en-US" sz="1400" dirty="0"/>
           </a:p>
         </p:txBody>
       </p:sp>
@@ -3734,7 +3853,7 @@
         <p:spPr>
           <a:xfrm>
             <a:off x="10137866" y="-20361"/>
-            <a:ext cx="679994" cy="369332"/>
+            <a:ext cx="569387" cy="307777"/>
           </a:xfrm>
           <a:prstGeom prst="rect">
             <a:avLst/>
@@ -3748,7 +3867,7 @@
           <a:lstStyle/>
           <a:p>
             <a:r>
-              <a:rPr lang="en-US" dirty="0"/>
+              <a:rPr lang="en-US" sz="1400" dirty="0"/>
               <a:t>= File</a:t>
             </a:r>
           </a:p>
@@ -3769,7 +3888,7 @@
         <p:spPr>
           <a:xfrm>
             <a:off x="10154013" y="297360"/>
-            <a:ext cx="947760" cy="369332"/>
+            <a:ext cx="776944" cy="307777"/>
           </a:xfrm>
           <a:prstGeom prst="rect">
             <a:avLst/>
@@ -3783,7 +3902,7 @@
           <a:lstStyle/>
           <a:p>
             <a:r>
-              <a:rPr lang="en-US" dirty="0"/>
+              <a:rPr lang="en-US" sz="1400" dirty="0"/>
               <a:t>= Folder</a:t>
             </a:r>
           </a:p>
@@ -3834,7 +3953,7 @@
           <a:lstStyle/>
           <a:p>
             <a:pPr algn="ctr"/>
-            <a:endParaRPr lang="en-US" dirty="0"/>
+            <a:endParaRPr lang="en-US" sz="1400" dirty="0"/>
           </a:p>
         </p:txBody>
       </p:sp>
@@ -3854,7 +3973,7 @@
         </p:nvCxnSpPr>
         <p:spPr>
           <a:xfrm>
-            <a:off x="6096000" y="1201502"/>
+            <a:off x="5791199" y="1201502"/>
             <a:ext cx="0" cy="387812"/>
           </a:xfrm>
           <a:prstGeom prst="line">
@@ -3896,9 +4015,9 @@
           <p:nvPr/>
         </p:nvCxnSpPr>
         <p:spPr>
-          <a:xfrm>
-            <a:off x="1314450" y="1589315"/>
-            <a:ext cx="9407979" cy="0"/>
+          <a:xfrm flipV="1">
+            <a:off x="1110074" y="1589315"/>
+            <a:ext cx="10147935" cy="3418"/>
           </a:xfrm>
           <a:prstGeom prst="line">
             <a:avLst/>
@@ -3941,8 +4060,8 @@
         </p:nvCxnSpPr>
         <p:spPr>
           <a:xfrm>
-            <a:off x="1314450" y="1585564"/>
-            <a:ext cx="0" cy="758937"/>
+            <a:off x="1110074" y="1593063"/>
+            <a:ext cx="13609" cy="751434"/>
           </a:xfrm>
           <a:prstGeom prst="straightConnector1">
             <a:avLst/>
@@ -3985,7 +4104,7 @@
         </p:nvCxnSpPr>
         <p:spPr>
           <a:xfrm>
-            <a:off x="3676650" y="1578061"/>
+            <a:off x="3371849" y="1578061"/>
             <a:ext cx="0" cy="758937"/>
           </a:xfrm>
           <a:prstGeom prst="straightConnector1">
@@ -4029,7 +4148,7 @@
         </p:nvCxnSpPr>
         <p:spPr>
           <a:xfrm>
-            <a:off x="6096000" y="1578061"/>
+            <a:off x="6444342" y="1589314"/>
             <a:ext cx="0" cy="758937"/>
           </a:xfrm>
           <a:prstGeom prst="straightConnector1">
@@ -4073,7 +4192,7 @@
         </p:nvCxnSpPr>
         <p:spPr>
           <a:xfrm>
-            <a:off x="8403772" y="1585564"/>
+            <a:off x="7805057" y="1589314"/>
             <a:ext cx="0" cy="758937"/>
           </a:xfrm>
           <a:prstGeom prst="straightConnector1">
@@ -4117,7 +4236,7 @@
         </p:nvCxnSpPr>
         <p:spPr>
           <a:xfrm>
-            <a:off x="10722430" y="1578061"/>
+            <a:off x="9494524" y="1589314"/>
             <a:ext cx="0" cy="758937"/>
           </a:xfrm>
           <a:prstGeom prst="straightConnector1">
@@ -4145,126 +4264,6 @@
           </a:fontRef>
         </p:style>
       </p:cxnSp>
-      <p:sp>
-        <p:nvSpPr>
-          <p:cNvPr id="28" name="Rounded Rectangle 27">
-            <a:extLst>
-              <a:ext uri="{FF2B5EF4-FFF2-40B4-BE49-F238E27FC236}">
-                <a16:creationId xmlns:a16="http://schemas.microsoft.com/office/drawing/2014/main" id="{7EF4ED76-735D-8043-8CC3-FC23945D2DEC}"/>
-              </a:ext>
-            </a:extLst>
-          </p:cNvPr>
-          <p:cNvSpPr/>
-          <p:nvPr/>
-        </p:nvSpPr>
-        <p:spPr>
-          <a:xfrm>
-            <a:off x="9715506" y="3491519"/>
-            <a:ext cx="2030185" cy="555171"/>
-          </a:xfrm>
-          <a:prstGeom prst="roundRect">
-            <a:avLst/>
-          </a:prstGeom>
-          <a:solidFill>
-            <a:schemeClr val="accent2"/>
-          </a:solidFill>
-        </p:spPr>
-        <p:style>
-          <a:lnRef idx="2">
-            <a:schemeClr val="accent1">
-              <a:shade val="50000"/>
-            </a:schemeClr>
-          </a:lnRef>
-          <a:fillRef idx="1">
-            <a:schemeClr val="accent1"/>
-          </a:fillRef>
-          <a:effectRef idx="0">
-            <a:schemeClr val="accent1"/>
-          </a:effectRef>
-          <a:fontRef idx="minor">
-            <a:schemeClr val="lt1"/>
-          </a:fontRef>
-        </p:style>
-        <p:txBody>
-          <a:bodyPr rtlCol="0" anchor="ctr"/>
-          <a:lstStyle/>
-          <a:p>
-            <a:pPr algn="ctr"/>
-            <a:r>
-              <a:rPr lang="en-US" sz="1600" dirty="0" err="1"/>
-              <a:t>PlanoftheDay.pdf</a:t>
-            </a:r>
-            <a:endParaRPr lang="en-US" sz="1600" dirty="0"/>
-          </a:p>
-          <a:p>
-            <a:pPr algn="ctr"/>
-            <a:r>
-              <a:rPr lang="en-US" sz="1100" dirty="0"/>
-              <a:t>(Written for each day we plan to sample)</a:t>
-            </a:r>
-          </a:p>
-        </p:txBody>
-      </p:sp>
-      <p:sp>
-        <p:nvSpPr>
-          <p:cNvPr id="29" name="Rounded Rectangle 28">
-            <a:extLst>
-              <a:ext uri="{FF2B5EF4-FFF2-40B4-BE49-F238E27FC236}">
-                <a16:creationId xmlns:a16="http://schemas.microsoft.com/office/drawing/2014/main" id="{3CE4A773-3F91-574A-8162-0C6F0947D3AB}"/>
-              </a:ext>
-            </a:extLst>
-          </p:cNvPr>
-          <p:cNvSpPr/>
-          <p:nvPr/>
-        </p:nvSpPr>
-        <p:spPr>
-          <a:xfrm>
-            <a:off x="7421339" y="3491519"/>
-            <a:ext cx="2030185" cy="555171"/>
-          </a:xfrm>
-          <a:prstGeom prst="roundRect">
-            <a:avLst/>
-          </a:prstGeom>
-          <a:solidFill>
-            <a:schemeClr val="accent2"/>
-          </a:solidFill>
-        </p:spPr>
-        <p:style>
-          <a:lnRef idx="2">
-            <a:schemeClr val="accent1">
-              <a:shade val="50000"/>
-            </a:schemeClr>
-          </a:lnRef>
-          <a:fillRef idx="1">
-            <a:schemeClr val="accent1"/>
-          </a:fillRef>
-          <a:effectRef idx="0">
-            <a:schemeClr val="accent1"/>
-          </a:effectRef>
-          <a:fontRef idx="minor">
-            <a:schemeClr val="lt1"/>
-          </a:fontRef>
-        </p:style>
-        <p:txBody>
-          <a:bodyPr rtlCol="0" anchor="ctr"/>
-          <a:lstStyle/>
-          <a:p>
-            <a:pPr algn="ctr"/>
-            <a:r>
-              <a:rPr lang="en-US" sz="1600" dirty="0" err="1"/>
-              <a:t>ReportoftheDay.pdf</a:t>
-            </a:r>
-            <a:endParaRPr lang="en-US" sz="1600" dirty="0"/>
-          </a:p>
-          <a:p>
-            <a:pPr algn="ctr"/>
-            <a:r>
-              <a:rPr lang="en-US" sz="1100" dirty="0"/>
-              <a:t>(Written for each day we sampled)</a:t>
-            </a:r>
-          </a:p>
-        </p:txBody>
-      </p:sp>
       <p:cxnSp>
         <p:nvCxnSpPr>
           <p:cNvPr id="30" name="Straight Arrow Connector 29">
@@ -4281,7 +4280,7 @@
         </p:nvCxnSpPr>
         <p:spPr>
           <a:xfrm>
-            <a:off x="8436431" y="3178629"/>
+            <a:off x="8131630" y="3178629"/>
             <a:ext cx="0" cy="312890"/>
           </a:xfrm>
           <a:prstGeom prst="straightConnector1">
@@ -4325,7 +4324,7 @@
         </p:nvCxnSpPr>
         <p:spPr>
           <a:xfrm>
-            <a:off x="10700662" y="3171789"/>
+            <a:off x="10395861" y="3171789"/>
             <a:ext cx="0" cy="312890"/>
           </a:xfrm>
           <a:prstGeom prst="straightConnector1">
@@ -4369,8 +4368,8 @@
         </p:nvCxnSpPr>
         <p:spPr>
           <a:xfrm>
-            <a:off x="6096000" y="3171789"/>
-            <a:ext cx="4615547" cy="0"/>
+            <a:off x="6411684" y="3171789"/>
+            <a:ext cx="3995062" cy="0"/>
           </a:xfrm>
           <a:prstGeom prst="line">
             <a:avLst/>
@@ -4412,7 +4411,7 @@
         </p:nvCxnSpPr>
         <p:spPr>
           <a:xfrm>
-            <a:off x="6096000" y="2892169"/>
+            <a:off x="6411684" y="2899668"/>
             <a:ext cx="0" cy="286460"/>
           </a:xfrm>
           <a:prstGeom prst="line">
@@ -4422,6 +4421,196 @@
             <a:solidFill>
               <a:schemeClr val="tx1"/>
             </a:solidFill>
+          </a:ln>
+        </p:spPr>
+        <p:style>
+          <a:lnRef idx="1">
+            <a:schemeClr val="accent1"/>
+          </a:lnRef>
+          <a:fillRef idx="0">
+            <a:schemeClr val="accent1"/>
+          </a:fillRef>
+          <a:effectRef idx="0">
+            <a:schemeClr val="accent1"/>
+          </a:effectRef>
+          <a:fontRef idx="minor">
+            <a:schemeClr val="tx1"/>
+          </a:fontRef>
+        </p:style>
+      </p:cxnSp>
+      <p:cxnSp>
+        <p:nvCxnSpPr>
+          <p:cNvPr id="31" name="Straight Arrow Connector 30">
+            <a:extLst>
+              <a:ext uri="{FF2B5EF4-FFF2-40B4-BE49-F238E27FC236}">
+                <a16:creationId xmlns:a16="http://schemas.microsoft.com/office/drawing/2014/main" id="{FF65604F-362D-1141-8964-B71C0E1FEC8D}"/>
+              </a:ext>
+            </a:extLst>
+          </p:cNvPr>
+          <p:cNvCxnSpPr>
+            <a:cxnSpLocks/>
+          </p:cNvCxnSpPr>
+          <p:nvPr/>
+        </p:nvCxnSpPr>
+        <p:spPr>
+          <a:xfrm>
+            <a:off x="11258009" y="1589314"/>
+            <a:ext cx="0" cy="758937"/>
+          </a:xfrm>
+          <a:prstGeom prst="straightConnector1">
+            <a:avLst/>
+          </a:prstGeom>
+          <a:ln w="25400">
+            <a:solidFill>
+              <a:schemeClr val="tx1"/>
+            </a:solidFill>
+            <a:tailEnd type="triangle"/>
+          </a:ln>
+        </p:spPr>
+        <p:style>
+          <a:lnRef idx="1">
+            <a:schemeClr val="accent1"/>
+          </a:lnRef>
+          <a:fillRef idx="0">
+            <a:schemeClr val="accent1"/>
+          </a:fillRef>
+          <a:effectRef idx="0">
+            <a:schemeClr val="accent1"/>
+          </a:effectRef>
+          <a:fontRef idx="minor">
+            <a:schemeClr val="tx1"/>
+          </a:fontRef>
+        </p:style>
+      </p:cxnSp>
+      <p:sp>
+        <p:nvSpPr>
+          <p:cNvPr id="34" name="Rounded Rectangle 33">
+            <a:extLst>
+              <a:ext uri="{FF2B5EF4-FFF2-40B4-BE49-F238E27FC236}">
+                <a16:creationId xmlns:a16="http://schemas.microsoft.com/office/drawing/2014/main" id="{4754C2B5-598D-2642-A266-4521684EB8C4}"/>
+              </a:ext>
+            </a:extLst>
+          </p:cNvPr>
+          <p:cNvSpPr/>
+          <p:nvPr/>
+        </p:nvSpPr>
+        <p:spPr>
+          <a:xfrm>
+            <a:off x="10447022" y="2336998"/>
+            <a:ext cx="1570271" cy="555171"/>
+          </a:xfrm>
+          <a:prstGeom prst="roundRect">
+            <a:avLst/>
+          </a:prstGeom>
+          <a:solidFill>
+            <a:schemeClr val="accent2"/>
+          </a:solidFill>
+        </p:spPr>
+        <p:style>
+          <a:lnRef idx="2">
+            <a:schemeClr val="accent1">
+              <a:shade val="50000"/>
+            </a:schemeClr>
+          </a:lnRef>
+          <a:fillRef idx="1">
+            <a:schemeClr val="accent1"/>
+          </a:fillRef>
+          <a:effectRef idx="0">
+            <a:schemeClr val="accent1"/>
+          </a:effectRef>
+          <a:fontRef idx="minor">
+            <a:schemeClr val="lt1"/>
+          </a:fontRef>
+        </p:style>
+        <p:txBody>
+          <a:bodyPr rtlCol="0" anchor="ctr"/>
+          <a:lstStyle/>
+          <a:p>
+            <a:pPr algn="ctr"/>
+            <a:r>
+              <a:rPr lang="en-US" sz="1400" dirty="0" err="1"/>
+              <a:t>dunex-venv-requirements.txt</a:t>
+            </a:r>
+            <a:endParaRPr lang="en-US" sz="1400" dirty="0"/>
+          </a:p>
+        </p:txBody>
+      </p:sp>
+      <p:sp>
+        <p:nvSpPr>
+          <p:cNvPr id="35" name="Rounded Rectangle 34">
+            <a:extLst>
+              <a:ext uri="{FF2B5EF4-FFF2-40B4-BE49-F238E27FC236}">
+                <a16:creationId xmlns:a16="http://schemas.microsoft.com/office/drawing/2014/main" id="{CA0260BA-F973-9A4C-B04C-E6C6CC4BF95A}"/>
+              </a:ext>
+            </a:extLst>
+          </p:cNvPr>
+          <p:cNvSpPr/>
+          <p:nvPr/>
+        </p:nvSpPr>
+        <p:spPr>
+          <a:xfrm>
+            <a:off x="4760317" y="2344497"/>
+            <a:ext cx="1028697" cy="555171"/>
+          </a:xfrm>
+          <a:prstGeom prst="roundRect">
+            <a:avLst/>
+          </a:prstGeom>
+        </p:spPr>
+        <p:style>
+          <a:lnRef idx="2">
+            <a:schemeClr val="accent1">
+              <a:shade val="50000"/>
+            </a:schemeClr>
+          </a:lnRef>
+          <a:fillRef idx="1">
+            <a:schemeClr val="accent1"/>
+          </a:fillRef>
+          <a:effectRef idx="0">
+            <a:schemeClr val="accent1"/>
+          </a:effectRef>
+          <a:fontRef idx="minor">
+            <a:schemeClr val="lt1"/>
+          </a:fontRef>
+        </p:style>
+        <p:txBody>
+          <a:bodyPr rtlCol="0" anchor="ctr"/>
+          <a:lstStyle/>
+          <a:p>
+            <a:pPr algn="ctr"/>
+            <a:r>
+              <a:rPr lang="en-US" sz="1400" dirty="0"/>
+              <a:t>analysis</a:t>
+            </a:r>
+          </a:p>
+        </p:txBody>
+      </p:sp>
+      <p:cxnSp>
+        <p:nvCxnSpPr>
+          <p:cNvPr id="37" name="Straight Arrow Connector 36">
+            <a:extLst>
+              <a:ext uri="{FF2B5EF4-FFF2-40B4-BE49-F238E27FC236}">
+                <a16:creationId xmlns:a16="http://schemas.microsoft.com/office/drawing/2014/main" id="{6501C0BB-9C4E-EB44-955F-2C8576C6EABC}"/>
+              </a:ext>
+            </a:extLst>
+          </p:cNvPr>
+          <p:cNvCxnSpPr>
+            <a:cxnSpLocks/>
+          </p:cNvCxnSpPr>
+          <p:nvPr/>
+        </p:nvCxnSpPr>
+        <p:spPr>
+          <a:xfrm>
+            <a:off x="5268679" y="1589314"/>
+            <a:ext cx="0" cy="758937"/>
+          </a:xfrm>
+          <a:prstGeom prst="straightConnector1">
+            <a:avLst/>
+          </a:prstGeom>
+          <a:ln w="25400">
+            <a:solidFill>
+              <a:schemeClr val="tx1"/>
+            </a:solidFill>
+            <a:tailEnd type="triangle"/>
           </a:ln>
         </p:spPr>
         <p:style>

</xml_diff>